<commit_message>
week 3 notes, plus changes to week 2 I guess?
</commit_message>
<xml_diff>
--- a/week02/week02.pptx
+++ b/week02/week02.pptx
@@ -9,8 +9,8 @@
   </p:notesMasterIdLst>
   <p:sldIdLst>
     <p:sldId id="257" r:id="rId2"/>
-    <p:sldId id="316" r:id="rId3"/>
-    <p:sldId id="322" r:id="rId4"/>
+    <p:sldId id="322" r:id="rId3"/>
+    <p:sldId id="316" r:id="rId4"/>
     <p:sldId id="265" r:id="rId5"/>
     <p:sldId id="266" r:id="rId6"/>
     <p:sldId id="264" r:id="rId7"/>
@@ -5130,7 +5130,7 @@
             <a:fld id="{4C97315D-B0A9-48D4-95F5-92DD97B5F649}" type="datetimeFigureOut">
               <a:rPr lang="en-US" smtClean="0"/>
               <a:pPr/>
-              <a:t>9/3/14</a:t>
+              <a:t>9/4/14</a:t>
             </a:fld>
             <a:endParaRPr lang="en-US"/>
           </a:p>
@@ -5445,7 +5445,15 @@
           <a:p>
             <a:r>
               <a:rPr lang="en-US" dirty="0" smtClean="0"/>
-              <a:t>what’s hard about this?</a:t>
+              <a:t>a</a:t>
+            </a:r>
+            <a:r>
+              <a:rPr lang="en-US" baseline="0" dirty="0" smtClean="0"/>
+              <a:t> fun video now that we’ve learned something about </a:t>
+            </a:r>
+            <a:r>
+              <a:rPr lang="en-US" baseline="0" dirty="0" err="1" smtClean="0"/>
+              <a:t>javascript</a:t>
             </a:r>
             <a:endParaRPr lang="en-US" dirty="0"/>
           </a:p>
@@ -5478,7 +5486,7 @@
     </p:spTree>
     <p:extLst>
       <p:ext uri="{BB962C8B-B14F-4D97-AF65-F5344CB8AC3E}">
-        <p14:creationId xmlns:p14="http://schemas.microsoft.com/office/powerpoint/2010/main" val="4237053523"/>
+        <p14:creationId xmlns:p14="http://schemas.microsoft.com/office/powerpoint/2010/main" val="1380135269"/>
       </p:ext>
     </p:extLst>
   </p:cSld>
@@ -6493,15 +6501,7 @@
           <a:p>
             <a:r>
               <a:rPr lang="en-US" dirty="0" smtClean="0"/>
-              <a:t>a</a:t>
-            </a:r>
-            <a:r>
-              <a:rPr lang="en-US" baseline="0" dirty="0" smtClean="0"/>
-              <a:t> fun video now that we’ve learned something about </a:t>
-            </a:r>
-            <a:r>
-              <a:rPr lang="en-US" baseline="0" dirty="0" err="1" smtClean="0"/>
-              <a:t>javascript</a:t>
+              <a:t>what’s hard about this?</a:t>
             </a:r>
             <a:endParaRPr lang="en-US" dirty="0"/>
           </a:p>
@@ -6534,7 +6534,7 @@
     </p:spTree>
     <p:extLst>
       <p:ext uri="{BB962C8B-B14F-4D97-AF65-F5344CB8AC3E}">
-        <p14:creationId xmlns:p14="http://schemas.microsoft.com/office/powerpoint/2010/main" val="1380135269"/>
+        <p14:creationId xmlns:p14="http://schemas.microsoft.com/office/powerpoint/2010/main" val="4237053523"/>
       </p:ext>
     </p:extLst>
   </p:cSld>
@@ -7690,7 +7690,7 @@
             <a:fld id="{74C653CF-8D96-4205-8CB6-F0A06A1ADEDE}" type="datetimeFigureOut">
               <a:rPr lang="en-US" smtClean="0"/>
               <a:pPr/>
-              <a:t>9/3/14</a:t>
+              <a:t>9/4/14</a:t>
             </a:fld>
             <a:endParaRPr lang="en-US"/>
           </a:p>
@@ -8023,7 +8023,7 @@
             <a:fld id="{74C653CF-8D96-4205-8CB6-F0A06A1ADEDE}" type="datetimeFigureOut">
               <a:rPr lang="en-US" smtClean="0"/>
               <a:pPr/>
-              <a:t>9/3/14</a:t>
+              <a:t>9/4/14</a:t>
             </a:fld>
             <a:endParaRPr lang="en-US"/>
           </a:p>
@@ -8357,7 +8357,7 @@
             <a:fld id="{74C653CF-8D96-4205-8CB6-F0A06A1ADEDE}" type="datetimeFigureOut">
               <a:rPr lang="en-US" smtClean="0"/>
               <a:pPr/>
-              <a:t>9/3/14</a:t>
+              <a:t>9/4/14</a:t>
             </a:fld>
             <a:endParaRPr lang="en-US"/>
           </a:p>
@@ -8691,7 +8691,7 @@
             <a:fld id="{74C653CF-8D96-4205-8CB6-F0A06A1ADEDE}" type="datetimeFigureOut">
               <a:rPr lang="en-US" smtClean="0"/>
               <a:pPr/>
-              <a:t>9/3/14</a:t>
+              <a:t>9/4/14</a:t>
             </a:fld>
             <a:endParaRPr lang="en-US"/>
           </a:p>
@@ -9382,7 +9382,7 @@
             <a:fld id="{74C653CF-8D96-4205-8CB6-F0A06A1ADEDE}" type="datetimeFigureOut">
               <a:rPr lang="en-US" smtClean="0"/>
               <a:pPr/>
-              <a:t>9/3/14</a:t>
+              <a:t>9/4/14</a:t>
             </a:fld>
             <a:endParaRPr lang="en-US"/>
           </a:p>
@@ -9563,7 +9563,7 @@
             <a:fld id="{74C653CF-8D96-4205-8CB6-F0A06A1ADEDE}" type="datetimeFigureOut">
               <a:rPr lang="en-US" smtClean="0"/>
               <a:pPr/>
-              <a:t>9/3/14</a:t>
+              <a:t>9/4/14</a:t>
             </a:fld>
             <a:endParaRPr lang="en-US"/>
           </a:p>
@@ -9739,7 +9739,7 @@
             <a:fld id="{74C653CF-8D96-4205-8CB6-F0A06A1ADEDE}" type="datetimeFigureOut">
               <a:rPr lang="en-US" smtClean="0"/>
               <a:pPr/>
-              <a:t>9/3/14</a:t>
+              <a:t>9/4/14</a:t>
             </a:fld>
             <a:endParaRPr lang="en-US"/>
           </a:p>
@@ -9989,7 +9989,7 @@
             <a:fld id="{74C653CF-8D96-4205-8CB6-F0A06A1ADEDE}" type="datetimeFigureOut">
               <a:rPr lang="en-US" smtClean="0"/>
               <a:pPr/>
-              <a:t>9/3/14</a:t>
+              <a:t>9/4/14</a:t>
             </a:fld>
             <a:endParaRPr lang="en-US"/>
           </a:p>
@@ -10321,7 +10321,7 @@
             <a:fld id="{74C653CF-8D96-4205-8CB6-F0A06A1ADEDE}" type="datetimeFigureOut">
               <a:rPr lang="en-US" smtClean="0"/>
               <a:pPr/>
-              <a:t>9/3/14</a:t>
+              <a:t>9/4/14</a:t>
             </a:fld>
             <a:endParaRPr lang="en-US"/>
           </a:p>
@@ -10615,7 +10615,7 @@
             <a:fld id="{74C653CF-8D96-4205-8CB6-F0A06A1ADEDE}" type="datetimeFigureOut">
               <a:rPr lang="en-US" smtClean="0"/>
               <a:pPr/>
-              <a:t>9/3/14</a:t>
+              <a:t>9/4/14</a:t>
             </a:fld>
             <a:endParaRPr lang="en-US"/>
           </a:p>
@@ -11053,7 +11053,7 @@
             <a:fld id="{74C653CF-8D96-4205-8CB6-F0A06A1ADEDE}" type="datetimeFigureOut">
               <a:rPr lang="en-US" smtClean="0"/>
               <a:pPr/>
-              <a:t>9/3/14</a:t>
+              <a:t>9/4/14</a:t>
             </a:fld>
             <a:endParaRPr lang="en-US"/>
           </a:p>
@@ -11242,7 +11242,7 @@
             <a:fld id="{74C653CF-8D96-4205-8CB6-F0A06A1ADEDE}" type="datetimeFigureOut">
               <a:rPr lang="en-US" smtClean="0"/>
               <a:pPr/>
-              <a:t>9/3/14</a:t>
+              <a:t>9/4/14</a:t>
             </a:fld>
             <a:endParaRPr lang="en-US"/>
           </a:p>
@@ -11334,7 +11334,7 @@
             <a:fld id="{74C653CF-8D96-4205-8CB6-F0A06A1ADEDE}" type="datetimeFigureOut">
               <a:rPr lang="en-US" smtClean="0"/>
               <a:pPr/>
-              <a:t>9/3/14</a:t>
+              <a:t>9/4/14</a:t>
             </a:fld>
             <a:endParaRPr lang="en-US"/>
           </a:p>
@@ -11617,7 +11617,7 @@
             <a:fld id="{74C653CF-8D96-4205-8CB6-F0A06A1ADEDE}" type="datetimeFigureOut">
               <a:rPr lang="en-US" smtClean="0"/>
               <a:pPr/>
-              <a:t>9/3/14</a:t>
+              <a:t>9/4/14</a:t>
             </a:fld>
             <a:endParaRPr lang="en-US"/>
           </a:p>
@@ -11834,7 +11834,7 @@
             <a:fld id="{74C653CF-8D96-4205-8CB6-F0A06A1ADEDE}" type="datetimeFigureOut">
               <a:rPr lang="en-US" smtClean="0"/>
               <a:pPr/>
-              <a:t>9/3/14</a:t>
+              <a:t>9/4/14</a:t>
             </a:fld>
             <a:endParaRPr lang="en-US"/>
           </a:p>
@@ -14530,40 +14530,65 @@
           <a:chExt cx="0" cy="0"/>
         </a:xfrm>
       </p:grpSpPr>
-      <p:pic>
-        <p:nvPicPr>
-          <p:cNvPr id="5" name="Picture 4"/>
-          <p:cNvPicPr>
-            <a:picLocks noChangeAspect="1"/>
-          </p:cNvPicPr>
+      <p:sp>
+        <p:nvSpPr>
+          <p:cNvPr id="4" name="TextBox 3"/>
+          <p:cNvSpPr txBox="1"/>
           <p:nvPr/>
-        </p:nvPicPr>
-        <p:blipFill>
-          <a:blip r:embed="rId3"/>
-          <a:stretch>
-            <a:fillRect/>
-          </a:stretch>
-        </p:blipFill>
+        </p:nvSpPr>
         <p:spPr>
           <a:xfrm>
-            <a:off x="0" y="901700"/>
-            <a:ext cx="9144000" cy="5046513"/>
+            <a:off x="1066800" y="2895600"/>
+            <a:ext cx="7404591" cy="523220"/>
           </a:xfrm>
           <a:prstGeom prst="rect">
             <a:avLst/>
           </a:prstGeom>
+          <a:noFill/>
         </p:spPr>
-      </p:pic>
+        <p:txBody>
+          <a:bodyPr wrap="none" rtlCol="0">
+            <a:spAutoFit/>
+          </a:bodyPr>
+          <a:lstStyle/>
+          <a:p>
+            <a:r>
+              <a:rPr lang="en-US" sz="2800" dirty="0"/>
+              <a:t>https://</a:t>
+            </a:r>
+            <a:r>
+              <a:rPr lang="en-US" sz="2800" dirty="0" err="1"/>
+              <a:t>www.destroyallsoftware.com</a:t>
+            </a:r>
+            <a:r>
+              <a:rPr lang="en-US" sz="2800" dirty="0"/>
+              <a:t>/talks/</a:t>
+            </a:r>
+            <a:r>
+              <a:rPr lang="en-US" sz="2800" dirty="0" err="1"/>
+              <a:t>wat</a:t>
+            </a:r>
+            <a:endParaRPr lang="en-US" sz="2800" dirty="0"/>
+          </a:p>
+        </p:txBody>
+      </p:sp>
     </p:spTree>
     <p:extLst>
       <p:ext uri="{BB962C8B-B14F-4D97-AF65-F5344CB8AC3E}">
-        <p14:creationId xmlns:p14="http://schemas.microsoft.com/office/powerpoint/2010/main" val="280187496"/>
+        <p14:creationId xmlns:p14="http://schemas.microsoft.com/office/powerpoint/2010/main" val="3118194066"/>
       </p:ext>
     </p:extLst>
   </p:cSld>
   <p:clrMapOvr>
     <a:masterClrMapping/>
   </p:clrMapOvr>
+  <p:timing>
+    <p:tnLst>
+      <p:par>
+        <p:cTn xmlns:p14="http://schemas.microsoft.com/office/powerpoint/2010/main" id="1" dur="indefinite" restart="never" nodeType="tmRoot"/>
+      </p:par>
+    </p:tnLst>
+  </p:timing>
 </p:sld>
 </file>
 
@@ -16241,6 +16266,13 @@
   <p:clrMapOvr>
     <a:masterClrMapping/>
   </p:clrMapOvr>
+  <p:timing>
+    <p:tnLst>
+      <p:par>
+        <p:cTn xmlns:p14="http://schemas.microsoft.com/office/powerpoint/2010/main" id="1" dur="indefinite" restart="never" nodeType="tmRoot"/>
+      </p:par>
+    </p:tnLst>
+  </p:timing>
 </p:sld>
 </file>
 
@@ -16854,58 +16886,47 @@
           <a:chExt cx="0" cy="0"/>
         </a:xfrm>
       </p:grpSpPr>
-      <p:sp>
-        <p:nvSpPr>
-          <p:cNvPr id="4" name="TextBox 3"/>
-          <p:cNvSpPr txBox="1"/>
+      <p:pic>
+        <p:nvPicPr>
+          <p:cNvPr id="5" name="Picture 4"/>
+          <p:cNvPicPr>
+            <a:picLocks noChangeAspect="1"/>
+          </p:cNvPicPr>
           <p:nvPr/>
-        </p:nvSpPr>
+        </p:nvPicPr>
+        <p:blipFill>
+          <a:blip r:embed="rId3"/>
+          <a:stretch>
+            <a:fillRect/>
+          </a:stretch>
+        </p:blipFill>
         <p:spPr>
           <a:xfrm>
-            <a:off x="1066800" y="2895600"/>
-            <a:ext cx="7404591" cy="523220"/>
+            <a:off x="0" y="901700"/>
+            <a:ext cx="9144000" cy="5046513"/>
           </a:xfrm>
           <a:prstGeom prst="rect">
             <a:avLst/>
           </a:prstGeom>
-          <a:noFill/>
         </p:spPr>
-        <p:txBody>
-          <a:bodyPr wrap="none" rtlCol="0">
-            <a:spAutoFit/>
-          </a:bodyPr>
-          <a:lstStyle/>
-          <a:p>
-            <a:r>
-              <a:rPr lang="en-US" sz="2800" dirty="0"/>
-              <a:t>https://</a:t>
-            </a:r>
-            <a:r>
-              <a:rPr lang="en-US" sz="2800" dirty="0" err="1"/>
-              <a:t>www.destroyallsoftware.com</a:t>
-            </a:r>
-            <a:r>
-              <a:rPr lang="en-US" sz="2800" dirty="0"/>
-              <a:t>/talks/</a:t>
-            </a:r>
-            <a:r>
-              <a:rPr lang="en-US" sz="2800" dirty="0" err="1"/>
-              <a:t>wat</a:t>
-            </a:r>
-            <a:endParaRPr lang="en-US" sz="2800" dirty="0"/>
-          </a:p>
-        </p:txBody>
-      </p:sp>
+      </p:pic>
     </p:spTree>
     <p:extLst>
       <p:ext uri="{BB962C8B-B14F-4D97-AF65-F5344CB8AC3E}">
-        <p14:creationId xmlns:p14="http://schemas.microsoft.com/office/powerpoint/2010/main" val="3118194066"/>
+        <p14:creationId xmlns:p14="http://schemas.microsoft.com/office/powerpoint/2010/main" val="280187496"/>
       </p:ext>
     </p:extLst>
   </p:cSld>
   <p:clrMapOvr>
     <a:masterClrMapping/>
   </p:clrMapOvr>
+  <p:timing>
+    <p:tnLst>
+      <p:par>
+        <p:cTn xmlns:p14="http://schemas.microsoft.com/office/powerpoint/2010/main" id="1" dur="indefinite" restart="never" nodeType="tmRoot"/>
+      </p:par>
+    </p:tnLst>
+  </p:timing>
 </p:sld>
 </file>
 
@@ -18198,6 +18219,13 @@
   <p:clrMapOvr>
     <a:masterClrMapping/>
   </p:clrMapOvr>
+  <p:timing>
+    <p:tnLst>
+      <p:par>
+        <p:cTn xmlns:p14="http://schemas.microsoft.com/office/powerpoint/2010/main" id="1" dur="indefinite" restart="never" nodeType="tmRoot"/>
+      </p:par>
+    </p:tnLst>
+  </p:timing>
 </p:sld>
 </file>
 
@@ -18533,6 +18561,13 @@
   <p:clrMapOvr>
     <a:masterClrMapping/>
   </p:clrMapOvr>
+  <p:timing>
+    <p:tnLst>
+      <p:par>
+        <p:cTn xmlns:p14="http://schemas.microsoft.com/office/powerpoint/2010/main" id="1" dur="indefinite" restart="never" nodeType="tmRoot"/>
+      </p:par>
+    </p:tnLst>
+  </p:timing>
 </p:sld>
 </file>
 
@@ -19965,6 +20000,13 @@
   <p:clrMapOvr>
     <a:masterClrMapping/>
   </p:clrMapOvr>
+  <p:timing>
+    <p:tnLst>
+      <p:par>
+        <p:cTn xmlns:p14="http://schemas.microsoft.com/office/powerpoint/2010/main" id="1" dur="indefinite" restart="never" nodeType="tmRoot"/>
+      </p:par>
+    </p:tnLst>
+  </p:timing>
 </p:sld>
 </file>
 
@@ -20443,15 +20485,7 @@
             </a:br>
             <a:r>
               <a:rPr lang="en-US" dirty="0" smtClean="0"/>
-              <a:t>Project </a:t>
-            </a:r>
-            <a:r>
-              <a:rPr lang="en-US" dirty="0" smtClean="0"/>
-              <a:t>0 questions</a:t>
-            </a:r>
-            <a:r>
-              <a:rPr lang="en-US" dirty="0" smtClean="0"/>
-              <a:t>?</a:t>
+              <a:t>Project 0 questions?</a:t>
             </a:r>
             <a:br>
               <a:rPr lang="en-US" dirty="0" smtClean="0"/>
@@ -21078,6 +21112,13 @@
   <p:clrMapOvr>
     <a:masterClrMapping/>
   </p:clrMapOvr>
+  <p:timing>
+    <p:tnLst>
+      <p:par>
+        <p:cTn xmlns:p14="http://schemas.microsoft.com/office/powerpoint/2010/main" id="1" dur="indefinite" restart="never" nodeType="tmRoot"/>
+      </p:par>
+    </p:tnLst>
+  </p:timing>
 </p:sld>
 </file>
 

</xml_diff>